<commit_message>
Update change password need retype new pass
</commit_message>
<xml_diff>
--- a/doc/frontend/wireframe/TRN-MiniBlog_WireframeDesign_LAMVY.pptx
+++ b/doc/frontend/wireframe/TRN-MiniBlog_WireframeDesign_LAMVY.pptx
@@ -215,7 +215,7 @@
           </a:lstStyle>
           <a:p>
             <a:fld id="{0B14D75D-3A88-044C-B530-B9A2A8B351DB}" type="datetimeFigureOut">
-              <a:t>1/8/2015</a:t>
+              <a:t>1/9/2015</a:t>
             </a:fld>
             <a:endParaRPr kumimoji="1" lang="ja-JP" altLang="en-US"/>
           </a:p>
@@ -672,7 +672,7 @@
                 <a:ea typeface="ＭＳ Ｐゴシック"/>
               </a:rPr>
               <a:pPr/>
-              <a:t>2015/1/8</a:t>
+              <a:t>2015/1/9</a:t>
             </a:fld>
             <a:endParaRPr lang="ja-JP" altLang="en-US">
               <a:solidFill>
@@ -916,7 +916,7 @@
                 <a:ea typeface="ＭＳ Ｐゴシック"/>
               </a:rPr>
               <a:pPr/>
-              <a:t>2015/1/8</a:t>
+              <a:t>2015/1/9</a:t>
             </a:fld>
             <a:endParaRPr lang="ja-JP" altLang="en-US">
               <a:solidFill>
@@ -1170,7 +1170,7 @@
                 <a:ea typeface="ＭＳ Ｐゴシック"/>
               </a:rPr>
               <a:pPr/>
-              <a:t>2015/1/8</a:t>
+              <a:t>2015/1/9</a:t>
             </a:fld>
             <a:endParaRPr lang="ja-JP" altLang="en-US">
               <a:solidFill>
@@ -1307,7 +1307,7 @@
                 <a:ea typeface="ＭＳ Ｐゴシック"/>
               </a:rPr>
               <a:pPr/>
-              <a:t>2015/1/8</a:t>
+              <a:t>2015/1/9</a:t>
             </a:fld>
             <a:endParaRPr lang="ja-JP" altLang="en-US">
               <a:solidFill>
@@ -1416,12 +1416,12 @@
           <a:effectLst/>
           <a:extLst>
             <a:ext uri="{909E8E84-426E-40dd-AFC4-6F175D3DCCD1}">
-              <a14:hiddenFill xmlns="" xmlns:a14="http://schemas.microsoft.com/office/drawing/2010/main">
+              <a14:hiddenFill xmlns:a14="http://schemas.microsoft.com/office/drawing/2010/main" xmlns="">
                 <a:noFill/>
               </a14:hiddenFill>
             </a:ext>
             <a:ext uri="{AF507438-7753-43e0-B8FC-AC1667EBCBE1}">
-              <a14:hiddenEffects xmlns="" xmlns:a14="http://schemas.microsoft.com/office/drawing/2010/main">
+              <a14:hiddenEffects xmlns:a14="http://schemas.microsoft.com/office/drawing/2010/main" xmlns="">
                 <a:effectLst>
                   <a:outerShdw blurRad="63500" dist="38099" dir="2700000" algn="ctr" rotWithShape="0">
                     <a:schemeClr val="bg2">
@@ -1475,12 +1475,12 @@
           <a:effectLst/>
           <a:extLst>
             <a:ext uri="{909E8E84-426E-40dd-AFC4-6F175D3DCCD1}">
-              <a14:hiddenFill xmlns="" xmlns:a14="http://schemas.microsoft.com/office/drawing/2010/main">
+              <a14:hiddenFill xmlns:a14="http://schemas.microsoft.com/office/drawing/2010/main" xmlns="">
                 <a:noFill/>
               </a14:hiddenFill>
             </a:ext>
             <a:ext uri="{AF507438-7753-43e0-B8FC-AC1667EBCBE1}">
-              <a14:hiddenEffects xmlns="" xmlns:a14="http://schemas.microsoft.com/office/drawing/2010/main">
+              <a14:hiddenEffects xmlns:a14="http://schemas.microsoft.com/office/drawing/2010/main" xmlns="">
                 <a:effectLst>
                   <a:outerShdw blurRad="63500" dist="38099" dir="2700000" algn="ctr" rotWithShape="0">
                     <a:schemeClr val="bg2">
@@ -1538,7 +1538,7 @@
           <a:effectLst/>
           <a:extLst>
             <a:ext uri="{AF507438-7753-43e0-B8FC-AC1667EBCBE1}">
-              <a14:hiddenEffects xmlns="" xmlns:a14="http://schemas.microsoft.com/office/drawing/2010/main">
+              <a14:hiddenEffects xmlns:a14="http://schemas.microsoft.com/office/drawing/2010/main" xmlns="">
                 <a:effectLst>
                   <a:outerShdw blurRad="63500" dist="38099" dir="2700000" algn="ctr" rotWithShape="0">
                     <a:schemeClr val="bg2">
@@ -1594,7 +1594,7 @@
           <a:effectLst/>
           <a:extLst>
             <a:ext uri="{AF507438-7753-43e0-B8FC-AC1667EBCBE1}">
-              <a14:hiddenEffects xmlns="" xmlns:a14="http://schemas.microsoft.com/office/drawing/2010/main">
+              <a14:hiddenEffects xmlns:a14="http://schemas.microsoft.com/office/drawing/2010/main" xmlns="">
                 <a:effectLst>
                   <a:outerShdw blurRad="63500" dist="38099" dir="2700000" algn="ctr" rotWithShape="0">
                     <a:schemeClr val="bg2">
@@ -1647,14 +1647,14 @@
           <a:effectLst/>
           <a:extLst>
             <a:ext uri="{909E8E84-426E-40dd-AFC4-6F175D3DCCD1}">
-              <a14:hiddenFill xmlns="" xmlns:a14="http://schemas.microsoft.com/office/drawing/2010/main">
+              <a14:hiddenFill xmlns:a14="http://schemas.microsoft.com/office/drawing/2010/main" xmlns="">
                 <a:solidFill>
                   <a:schemeClr val="accent1"/>
                 </a:solidFill>
               </a14:hiddenFill>
             </a:ext>
             <a:ext uri="{91240B29-F687-4f45-9708-019B960494DF}">
-              <a14:hiddenLine xmlns="" xmlns:a14="http://schemas.microsoft.com/office/drawing/2010/main" w="9525">
+              <a14:hiddenLine xmlns:a14="http://schemas.microsoft.com/office/drawing/2010/main" xmlns="" w="9525">
                 <a:solidFill>
                   <a:schemeClr val="tx1"/>
                 </a:solidFill>
@@ -1664,7 +1664,7 @@
               </a14:hiddenLine>
             </a:ext>
             <a:ext uri="{AF507438-7753-43e0-B8FC-AC1667EBCBE1}">
-              <a14:hiddenEffects xmlns="" xmlns:a14="http://schemas.microsoft.com/office/drawing/2010/main">
+              <a14:hiddenEffects xmlns:a14="http://schemas.microsoft.com/office/drawing/2010/main" xmlns="">
                 <a:effectLst>
                   <a:outerShdw blurRad="63500" dist="38099" dir="2700000" algn="ctr" rotWithShape="0">
                     <a:schemeClr val="bg2">
@@ -1675,7 +1675,7 @@
               </a14:hiddenEffects>
             </a:ext>
             <a:ext uri="{FAA26D3D-D897-4be2-8F04-BA451C77F1D7}">
-              <ma14:placeholderFlag xmlns="" xmlns:ma14="http://schemas.microsoft.com/office/mac/drawingml/2011/main" val="1"/>
+              <ma14:placeholderFlag xmlns:ma14="http://schemas.microsoft.com/office/mac/drawingml/2011/main" xmlns="" val="1"/>
             </a:ext>
           </a:extLst>
         </p:spPr>
@@ -1827,7 +1827,7 @@
           <a:noFill/>
           <a:extLst>
             <a:ext uri="{909E8E84-426E-40dd-AFC4-6F175D3DCCD1}">
-              <a14:hiddenFill xmlns="" xmlns:a14="http://schemas.microsoft.com/office/drawing/2010/main">
+              <a14:hiddenFill xmlns:a14="http://schemas.microsoft.com/office/drawing/2010/main" xmlns="">
                 <a:solidFill>
                   <a:srgbClr val="FFFFFF"/>
                 </a:solidFill>
@@ -1859,14 +1859,14 @@
           <a:effectLst/>
           <a:extLst>
             <a:ext uri="{909E8E84-426E-40dd-AFC4-6F175D3DCCD1}">
-              <a14:hiddenFill xmlns="" xmlns:a14="http://schemas.microsoft.com/office/drawing/2010/main">
+              <a14:hiddenFill xmlns:a14="http://schemas.microsoft.com/office/drawing/2010/main" xmlns="">
                 <a:solidFill>
                   <a:schemeClr val="accent1"/>
                 </a:solidFill>
               </a14:hiddenFill>
             </a:ext>
             <a:ext uri="{91240B29-F687-4f45-9708-019B960494DF}">
-              <a14:hiddenLine xmlns="" xmlns:a14="http://schemas.microsoft.com/office/drawing/2010/main" w="9525">
+              <a14:hiddenLine xmlns:a14="http://schemas.microsoft.com/office/drawing/2010/main" xmlns="" w="9525">
                 <a:solidFill>
                   <a:schemeClr val="tx1"/>
                 </a:solidFill>
@@ -1876,7 +1876,7 @@
               </a14:hiddenLine>
             </a:ext>
             <a:ext uri="{AF507438-7753-43e0-B8FC-AC1667EBCBE1}">
-              <a14:hiddenEffects xmlns="" xmlns:a14="http://schemas.microsoft.com/office/drawing/2010/main">
+              <a14:hiddenEffects xmlns:a14="http://schemas.microsoft.com/office/drawing/2010/main" xmlns="">
                 <a:effectLst>
                   <a:outerShdw blurRad="63500" dist="38099" dir="2700000" algn="ctr" rotWithShape="0">
                     <a:schemeClr val="bg2">
@@ -1978,7 +1978,7 @@
                 <a:ea typeface="ＭＳ Ｐゴシック"/>
               </a:rPr>
               <a:pPr/>
-              <a:t>2015/1/8</a:t>
+              <a:t>2015/1/9</a:t>
             </a:fld>
             <a:endParaRPr lang="ja-JP" altLang="en-US">
               <a:solidFill>
@@ -2087,12 +2087,12 @@
           <a:effectLst/>
           <a:extLst>
             <a:ext uri="{909E8E84-426E-40dd-AFC4-6F175D3DCCD1}">
-              <a14:hiddenFill xmlns="" xmlns:a14="http://schemas.microsoft.com/office/drawing/2010/main">
+              <a14:hiddenFill xmlns:a14="http://schemas.microsoft.com/office/drawing/2010/main" xmlns="">
                 <a:noFill/>
               </a14:hiddenFill>
             </a:ext>
             <a:ext uri="{AF507438-7753-43e0-B8FC-AC1667EBCBE1}">
-              <a14:hiddenEffects xmlns="" xmlns:a14="http://schemas.microsoft.com/office/drawing/2010/main">
+              <a14:hiddenEffects xmlns:a14="http://schemas.microsoft.com/office/drawing/2010/main" xmlns="">
                 <a:effectLst>
                   <a:outerShdw blurRad="63500" dist="38099" dir="2700000" algn="ctr" rotWithShape="0">
                     <a:schemeClr val="bg2">
@@ -2146,12 +2146,12 @@
           <a:effectLst/>
           <a:extLst>
             <a:ext uri="{909E8E84-426E-40dd-AFC4-6F175D3DCCD1}">
-              <a14:hiddenFill xmlns="" xmlns:a14="http://schemas.microsoft.com/office/drawing/2010/main">
+              <a14:hiddenFill xmlns:a14="http://schemas.microsoft.com/office/drawing/2010/main" xmlns="">
                 <a:noFill/>
               </a14:hiddenFill>
             </a:ext>
             <a:ext uri="{AF507438-7753-43e0-B8FC-AC1667EBCBE1}">
-              <a14:hiddenEffects xmlns="" xmlns:a14="http://schemas.microsoft.com/office/drawing/2010/main">
+              <a14:hiddenEffects xmlns:a14="http://schemas.microsoft.com/office/drawing/2010/main" xmlns="">
                 <a:effectLst>
                   <a:outerShdw blurRad="63500" dist="38099" dir="2700000" algn="ctr" rotWithShape="0">
                     <a:schemeClr val="bg2">
@@ -2209,7 +2209,7 @@
           <a:effectLst/>
           <a:extLst>
             <a:ext uri="{AF507438-7753-43e0-B8FC-AC1667EBCBE1}">
-              <a14:hiddenEffects xmlns="" xmlns:a14="http://schemas.microsoft.com/office/drawing/2010/main">
+              <a14:hiddenEffects xmlns:a14="http://schemas.microsoft.com/office/drawing/2010/main" xmlns="">
                 <a:effectLst>
                   <a:outerShdw blurRad="63500" dist="38099" dir="2700000" algn="ctr" rotWithShape="0">
                     <a:schemeClr val="bg2">
@@ -2265,7 +2265,7 @@
           <a:effectLst/>
           <a:extLst>
             <a:ext uri="{AF507438-7753-43e0-B8FC-AC1667EBCBE1}">
-              <a14:hiddenEffects xmlns="" xmlns:a14="http://schemas.microsoft.com/office/drawing/2010/main">
+              <a14:hiddenEffects xmlns:a14="http://schemas.microsoft.com/office/drawing/2010/main" xmlns="">
                 <a:effectLst>
                   <a:outerShdw blurRad="63500" dist="38099" dir="2700000" algn="ctr" rotWithShape="0">
                     <a:schemeClr val="bg2">
@@ -2318,14 +2318,14 @@
           <a:effectLst/>
           <a:extLst>
             <a:ext uri="{909E8E84-426E-40dd-AFC4-6F175D3DCCD1}">
-              <a14:hiddenFill xmlns="" xmlns:a14="http://schemas.microsoft.com/office/drawing/2010/main">
+              <a14:hiddenFill xmlns:a14="http://schemas.microsoft.com/office/drawing/2010/main" xmlns="">
                 <a:solidFill>
                   <a:schemeClr val="accent1"/>
                 </a:solidFill>
               </a14:hiddenFill>
             </a:ext>
             <a:ext uri="{91240B29-F687-4f45-9708-019B960494DF}">
-              <a14:hiddenLine xmlns="" xmlns:a14="http://schemas.microsoft.com/office/drawing/2010/main" w="9525">
+              <a14:hiddenLine xmlns:a14="http://schemas.microsoft.com/office/drawing/2010/main" xmlns="" w="9525">
                 <a:solidFill>
                   <a:schemeClr val="tx1"/>
                 </a:solidFill>
@@ -2335,7 +2335,7 @@
               </a14:hiddenLine>
             </a:ext>
             <a:ext uri="{AF507438-7753-43e0-B8FC-AC1667EBCBE1}">
-              <a14:hiddenEffects xmlns="" xmlns:a14="http://schemas.microsoft.com/office/drawing/2010/main">
+              <a14:hiddenEffects xmlns:a14="http://schemas.microsoft.com/office/drawing/2010/main" xmlns="">
                 <a:effectLst>
                   <a:outerShdw blurRad="63500" dist="38099" dir="2700000" algn="ctr" rotWithShape="0">
                     <a:schemeClr val="bg2">
@@ -2346,7 +2346,7 @@
               </a14:hiddenEffects>
             </a:ext>
             <a:ext uri="{FAA26D3D-D897-4be2-8F04-BA451C77F1D7}">
-              <ma14:placeholderFlag xmlns="" xmlns:ma14="http://schemas.microsoft.com/office/mac/drawingml/2011/main" val="1"/>
+              <ma14:placeholderFlag xmlns:ma14="http://schemas.microsoft.com/office/mac/drawingml/2011/main" xmlns="" val="1"/>
             </a:ext>
           </a:extLst>
         </p:spPr>
@@ -2498,7 +2498,7 @@
           <a:noFill/>
           <a:extLst>
             <a:ext uri="{909E8E84-426E-40dd-AFC4-6F175D3DCCD1}">
-              <a14:hiddenFill xmlns="" xmlns:a14="http://schemas.microsoft.com/office/drawing/2010/main">
+              <a14:hiddenFill xmlns:a14="http://schemas.microsoft.com/office/drawing/2010/main" xmlns="">
                 <a:solidFill>
                   <a:srgbClr val="FFFFFF"/>
                 </a:solidFill>
@@ -2530,14 +2530,14 @@
           <a:effectLst/>
           <a:extLst>
             <a:ext uri="{909E8E84-426E-40dd-AFC4-6F175D3DCCD1}">
-              <a14:hiddenFill xmlns="" xmlns:a14="http://schemas.microsoft.com/office/drawing/2010/main">
+              <a14:hiddenFill xmlns:a14="http://schemas.microsoft.com/office/drawing/2010/main" xmlns="">
                 <a:solidFill>
                   <a:schemeClr val="accent1"/>
                 </a:solidFill>
               </a14:hiddenFill>
             </a:ext>
             <a:ext uri="{91240B29-F687-4f45-9708-019B960494DF}">
-              <a14:hiddenLine xmlns="" xmlns:a14="http://schemas.microsoft.com/office/drawing/2010/main" w="9525">
+              <a14:hiddenLine xmlns:a14="http://schemas.microsoft.com/office/drawing/2010/main" xmlns="" w="9525">
                 <a:solidFill>
                   <a:schemeClr val="tx1"/>
                 </a:solidFill>
@@ -2547,7 +2547,7 @@
               </a14:hiddenLine>
             </a:ext>
             <a:ext uri="{AF507438-7753-43e0-B8FC-AC1667EBCBE1}">
-              <a14:hiddenEffects xmlns="" xmlns:a14="http://schemas.microsoft.com/office/drawing/2010/main">
+              <a14:hiddenEffects xmlns:a14="http://schemas.microsoft.com/office/drawing/2010/main" xmlns="">
                 <a:effectLst>
                   <a:outerShdw blurRad="63500" dist="38099" dir="2700000" algn="ctr" rotWithShape="0">
                     <a:schemeClr val="bg2">
@@ -2649,7 +2649,7 @@
                 <a:ea typeface="ＭＳ Ｐゴシック"/>
               </a:rPr>
               <a:pPr/>
-              <a:t>2015/1/8</a:t>
+              <a:t>2015/1/9</a:t>
             </a:fld>
             <a:endParaRPr lang="ja-JP" altLang="en-US">
               <a:solidFill>
@@ -2758,12 +2758,12 @@
           <a:effectLst/>
           <a:extLst>
             <a:ext uri="{909E8E84-426E-40dd-AFC4-6F175D3DCCD1}">
-              <a14:hiddenFill xmlns="" xmlns:a14="http://schemas.microsoft.com/office/drawing/2010/main">
+              <a14:hiddenFill xmlns:a14="http://schemas.microsoft.com/office/drawing/2010/main" xmlns="">
                 <a:noFill/>
               </a14:hiddenFill>
             </a:ext>
             <a:ext uri="{AF507438-7753-43e0-B8FC-AC1667EBCBE1}">
-              <a14:hiddenEffects xmlns="" xmlns:a14="http://schemas.microsoft.com/office/drawing/2010/main">
+              <a14:hiddenEffects xmlns:a14="http://schemas.microsoft.com/office/drawing/2010/main" xmlns="">
                 <a:effectLst>
                   <a:outerShdw blurRad="63500" dist="38099" dir="2700000" algn="ctr" rotWithShape="0">
                     <a:schemeClr val="bg2">
@@ -2817,12 +2817,12 @@
           <a:effectLst/>
           <a:extLst>
             <a:ext uri="{909E8E84-426E-40dd-AFC4-6F175D3DCCD1}">
-              <a14:hiddenFill xmlns="" xmlns:a14="http://schemas.microsoft.com/office/drawing/2010/main">
+              <a14:hiddenFill xmlns:a14="http://schemas.microsoft.com/office/drawing/2010/main" xmlns="">
                 <a:noFill/>
               </a14:hiddenFill>
             </a:ext>
             <a:ext uri="{AF507438-7753-43e0-B8FC-AC1667EBCBE1}">
-              <a14:hiddenEffects xmlns="" xmlns:a14="http://schemas.microsoft.com/office/drawing/2010/main">
+              <a14:hiddenEffects xmlns:a14="http://schemas.microsoft.com/office/drawing/2010/main" xmlns="">
                 <a:effectLst>
                   <a:outerShdw blurRad="63500" dist="38099" dir="2700000" algn="ctr" rotWithShape="0">
                     <a:schemeClr val="bg2">
@@ -2880,7 +2880,7 @@
           <a:effectLst/>
           <a:extLst>
             <a:ext uri="{AF507438-7753-43e0-B8FC-AC1667EBCBE1}">
-              <a14:hiddenEffects xmlns="" xmlns:a14="http://schemas.microsoft.com/office/drawing/2010/main">
+              <a14:hiddenEffects xmlns:a14="http://schemas.microsoft.com/office/drawing/2010/main" xmlns="">
                 <a:effectLst>
                   <a:outerShdw blurRad="63500" dist="38099" dir="2700000" algn="ctr" rotWithShape="0">
                     <a:schemeClr val="bg2">
@@ -2936,7 +2936,7 @@
           <a:effectLst/>
           <a:extLst>
             <a:ext uri="{AF507438-7753-43e0-B8FC-AC1667EBCBE1}">
-              <a14:hiddenEffects xmlns="" xmlns:a14="http://schemas.microsoft.com/office/drawing/2010/main">
+              <a14:hiddenEffects xmlns:a14="http://schemas.microsoft.com/office/drawing/2010/main" xmlns="">
                 <a:effectLst>
                   <a:outerShdw blurRad="63500" dist="38099" dir="2700000" algn="ctr" rotWithShape="0">
                     <a:schemeClr val="bg2">
@@ -2989,14 +2989,14 @@
           <a:effectLst/>
           <a:extLst>
             <a:ext uri="{909E8E84-426E-40dd-AFC4-6F175D3DCCD1}">
-              <a14:hiddenFill xmlns="" xmlns:a14="http://schemas.microsoft.com/office/drawing/2010/main">
+              <a14:hiddenFill xmlns:a14="http://schemas.microsoft.com/office/drawing/2010/main" xmlns="">
                 <a:solidFill>
                   <a:schemeClr val="accent1"/>
                 </a:solidFill>
               </a14:hiddenFill>
             </a:ext>
             <a:ext uri="{91240B29-F687-4f45-9708-019B960494DF}">
-              <a14:hiddenLine xmlns="" xmlns:a14="http://schemas.microsoft.com/office/drawing/2010/main" w="9525">
+              <a14:hiddenLine xmlns:a14="http://schemas.microsoft.com/office/drawing/2010/main" xmlns="" w="9525">
                 <a:solidFill>
                   <a:schemeClr val="tx1"/>
                 </a:solidFill>
@@ -3006,7 +3006,7 @@
               </a14:hiddenLine>
             </a:ext>
             <a:ext uri="{AF507438-7753-43e0-B8FC-AC1667EBCBE1}">
-              <a14:hiddenEffects xmlns="" xmlns:a14="http://schemas.microsoft.com/office/drawing/2010/main">
+              <a14:hiddenEffects xmlns:a14="http://schemas.microsoft.com/office/drawing/2010/main" xmlns="">
                 <a:effectLst>
                   <a:outerShdw blurRad="63500" dist="38099" dir="2700000" algn="ctr" rotWithShape="0">
                     <a:schemeClr val="bg2">
@@ -3017,7 +3017,7 @@
               </a14:hiddenEffects>
             </a:ext>
             <a:ext uri="{FAA26D3D-D897-4be2-8F04-BA451C77F1D7}">
-              <ma14:placeholderFlag xmlns="" xmlns:ma14="http://schemas.microsoft.com/office/mac/drawingml/2011/main" val="1"/>
+              <ma14:placeholderFlag xmlns:ma14="http://schemas.microsoft.com/office/mac/drawingml/2011/main" xmlns="" val="1"/>
             </a:ext>
           </a:extLst>
         </p:spPr>
@@ -3169,7 +3169,7 @@
           <a:noFill/>
           <a:extLst>
             <a:ext uri="{909E8E84-426E-40dd-AFC4-6F175D3DCCD1}">
-              <a14:hiddenFill xmlns="" xmlns:a14="http://schemas.microsoft.com/office/drawing/2010/main">
+              <a14:hiddenFill xmlns:a14="http://schemas.microsoft.com/office/drawing/2010/main" xmlns="">
                 <a:solidFill>
                   <a:srgbClr val="FFFFFF"/>
                 </a:solidFill>
@@ -3201,14 +3201,14 @@
           <a:effectLst/>
           <a:extLst>
             <a:ext uri="{909E8E84-426E-40dd-AFC4-6F175D3DCCD1}">
-              <a14:hiddenFill xmlns="" xmlns:a14="http://schemas.microsoft.com/office/drawing/2010/main">
+              <a14:hiddenFill xmlns:a14="http://schemas.microsoft.com/office/drawing/2010/main" xmlns="">
                 <a:solidFill>
                   <a:schemeClr val="accent1"/>
                 </a:solidFill>
               </a14:hiddenFill>
             </a:ext>
             <a:ext uri="{91240B29-F687-4f45-9708-019B960494DF}">
-              <a14:hiddenLine xmlns="" xmlns:a14="http://schemas.microsoft.com/office/drawing/2010/main" w="9525">
+              <a14:hiddenLine xmlns:a14="http://schemas.microsoft.com/office/drawing/2010/main" xmlns="" w="9525">
                 <a:solidFill>
                   <a:schemeClr val="tx1"/>
                 </a:solidFill>
@@ -3218,7 +3218,7 @@
               </a14:hiddenLine>
             </a:ext>
             <a:ext uri="{AF507438-7753-43e0-B8FC-AC1667EBCBE1}">
-              <a14:hiddenEffects xmlns="" xmlns:a14="http://schemas.microsoft.com/office/drawing/2010/main">
+              <a14:hiddenEffects xmlns:a14="http://schemas.microsoft.com/office/drawing/2010/main" xmlns="">
                 <a:effectLst>
                   <a:outerShdw blurRad="63500" dist="38099" dir="2700000" algn="ctr" rotWithShape="0">
                     <a:schemeClr val="bg2">
@@ -3427,7 +3427,7 @@
                 <a:ea typeface="ＭＳ Ｐゴシック"/>
               </a:rPr>
               <a:pPr/>
-              <a:t>2015/1/8</a:t>
+              <a:t>2015/1/9</a:t>
             </a:fld>
             <a:endParaRPr lang="ja-JP" altLang="en-US">
               <a:solidFill>
@@ -3535,7 +3535,7 @@
           <a:effectLst/>
           <a:extLst>
             <a:ext uri="{91240B29-F687-4f45-9708-019B960494DF}">
-              <a14:hiddenLine xmlns="" xmlns:a14="http://schemas.microsoft.com/office/drawing/2010/main" w="9525">
+              <a14:hiddenLine xmlns:a14="http://schemas.microsoft.com/office/drawing/2010/main" xmlns="" w="9525">
                 <a:solidFill>
                   <a:schemeClr val="tx1"/>
                 </a:solidFill>
@@ -3545,7 +3545,7 @@
               </a14:hiddenLine>
             </a:ext>
             <a:ext uri="{AF507438-7753-43e0-B8FC-AC1667EBCBE1}">
-              <a14:hiddenEffects xmlns="" xmlns:a14="http://schemas.microsoft.com/office/drawing/2010/main">
+              <a14:hiddenEffects xmlns:a14="http://schemas.microsoft.com/office/drawing/2010/main" xmlns="">
                 <a:effectLst>
                   <a:outerShdw blurRad="63500" dist="38099" dir="2700000" algn="ctr" rotWithShape="0">
                     <a:schemeClr val="bg2">
@@ -3601,7 +3601,7 @@
           <a:effectLst/>
           <a:extLst>
             <a:ext uri="{AF507438-7753-43e0-B8FC-AC1667EBCBE1}">
-              <a14:hiddenEffects xmlns="" xmlns:a14="http://schemas.microsoft.com/office/drawing/2010/main">
+              <a14:hiddenEffects xmlns:a14="http://schemas.microsoft.com/office/drawing/2010/main" xmlns="">
                 <a:effectLst>
                   <a:outerShdw blurRad="63500" dist="38099" dir="2700000" algn="ctr" rotWithShape="0">
                     <a:schemeClr val="bg2">
@@ -3654,14 +3654,14 @@
           <a:effectLst/>
           <a:extLst>
             <a:ext uri="{909E8E84-426E-40dd-AFC4-6F175D3DCCD1}">
-              <a14:hiddenFill xmlns="" xmlns:a14="http://schemas.microsoft.com/office/drawing/2010/main">
+              <a14:hiddenFill xmlns:a14="http://schemas.microsoft.com/office/drawing/2010/main" xmlns="">
                 <a:solidFill>
                   <a:schemeClr val="accent1"/>
                 </a:solidFill>
               </a14:hiddenFill>
             </a:ext>
             <a:ext uri="{91240B29-F687-4f45-9708-019B960494DF}">
-              <a14:hiddenLine xmlns="" xmlns:a14="http://schemas.microsoft.com/office/drawing/2010/main" w="9525">
+              <a14:hiddenLine xmlns:a14="http://schemas.microsoft.com/office/drawing/2010/main" xmlns="" w="9525">
                 <a:solidFill>
                   <a:schemeClr val="tx1"/>
                 </a:solidFill>
@@ -3671,7 +3671,7 @@
               </a14:hiddenLine>
             </a:ext>
             <a:ext uri="{AF507438-7753-43e0-B8FC-AC1667EBCBE1}">
-              <a14:hiddenEffects xmlns="" xmlns:a14="http://schemas.microsoft.com/office/drawing/2010/main">
+              <a14:hiddenEffects xmlns:a14="http://schemas.microsoft.com/office/drawing/2010/main" xmlns="">
                 <a:effectLst>
                   <a:outerShdw blurRad="63500" dist="38099" dir="2700000" algn="ctr" rotWithShape="0">
                     <a:schemeClr val="bg2">
@@ -3749,7 +3749,7 @@
           <a:noFill/>
           <a:extLst>
             <a:ext uri="{909E8E84-426E-40dd-AFC4-6F175D3DCCD1}">
-              <a14:hiddenFill xmlns="" xmlns:a14="http://schemas.microsoft.com/office/drawing/2010/main">
+              <a14:hiddenFill xmlns:a14="http://schemas.microsoft.com/office/drawing/2010/main" xmlns="">
                 <a:solidFill>
                   <a:srgbClr val="FFFFFF"/>
                 </a:solidFill>
@@ -3965,7 +3965,7 @@
                 <a:ea typeface="ＭＳ Ｐゴシック"/>
               </a:rPr>
               <a:pPr/>
-              <a:t>2015/1/8</a:t>
+              <a:t>2015/1/9</a:t>
             </a:fld>
             <a:endParaRPr lang="ja-JP" altLang="en-US">
               <a:solidFill>
@@ -4359,7 +4359,7 @@
                 <a:ea typeface="ＭＳ Ｐゴシック"/>
               </a:rPr>
               <a:pPr/>
-              <a:t>2015/1/8</a:t>
+              <a:t>2015/1/9</a:t>
             </a:fld>
             <a:endParaRPr lang="ja-JP" altLang="en-US">
               <a:solidFill>
@@ -4468,12 +4468,12 @@
           <a:effectLst/>
           <a:extLst>
             <a:ext uri="{909E8E84-426E-40dd-AFC4-6F175D3DCCD1}">
-              <a14:hiddenFill xmlns="" xmlns:a14="http://schemas.microsoft.com/office/drawing/2010/main">
+              <a14:hiddenFill xmlns:a14="http://schemas.microsoft.com/office/drawing/2010/main" xmlns="">
                 <a:noFill/>
               </a14:hiddenFill>
             </a:ext>
             <a:ext uri="{AF507438-7753-43e0-B8FC-AC1667EBCBE1}">
-              <a14:hiddenEffects xmlns="" xmlns:a14="http://schemas.microsoft.com/office/drawing/2010/main">
+              <a14:hiddenEffects xmlns:a14="http://schemas.microsoft.com/office/drawing/2010/main" xmlns="">
                 <a:effectLst>
                   <a:outerShdw blurRad="63500" dist="38099" dir="2700000" algn="ctr" rotWithShape="0">
                     <a:schemeClr val="bg2">
@@ -4527,12 +4527,12 @@
           <a:effectLst/>
           <a:extLst>
             <a:ext uri="{909E8E84-426E-40dd-AFC4-6F175D3DCCD1}">
-              <a14:hiddenFill xmlns="" xmlns:a14="http://schemas.microsoft.com/office/drawing/2010/main">
+              <a14:hiddenFill xmlns:a14="http://schemas.microsoft.com/office/drawing/2010/main" xmlns="">
                 <a:noFill/>
               </a14:hiddenFill>
             </a:ext>
             <a:ext uri="{AF507438-7753-43e0-B8FC-AC1667EBCBE1}">
-              <a14:hiddenEffects xmlns="" xmlns:a14="http://schemas.microsoft.com/office/drawing/2010/main">
+              <a14:hiddenEffects xmlns:a14="http://schemas.microsoft.com/office/drawing/2010/main" xmlns="">
                 <a:effectLst>
                   <a:outerShdw blurRad="63500" dist="38099" dir="2700000" algn="ctr" rotWithShape="0">
                     <a:schemeClr val="bg2">
@@ -4590,7 +4590,7 @@
           <a:effectLst/>
           <a:extLst>
             <a:ext uri="{AF507438-7753-43e0-B8FC-AC1667EBCBE1}">
-              <a14:hiddenEffects xmlns="" xmlns:a14="http://schemas.microsoft.com/office/drawing/2010/main">
+              <a14:hiddenEffects xmlns:a14="http://schemas.microsoft.com/office/drawing/2010/main" xmlns="">
                 <a:effectLst>
                   <a:outerShdw blurRad="63500" dist="38099" dir="2700000" algn="ctr" rotWithShape="0">
                     <a:schemeClr val="bg2">
@@ -4646,7 +4646,7 @@
           <a:effectLst/>
           <a:extLst>
             <a:ext uri="{AF507438-7753-43e0-B8FC-AC1667EBCBE1}">
-              <a14:hiddenEffects xmlns="" xmlns:a14="http://schemas.microsoft.com/office/drawing/2010/main">
+              <a14:hiddenEffects xmlns:a14="http://schemas.microsoft.com/office/drawing/2010/main" xmlns="">
                 <a:effectLst>
                   <a:outerShdw blurRad="63500" dist="38099" dir="2700000" algn="ctr" rotWithShape="0">
                     <a:schemeClr val="bg2">
@@ -4708,7 +4708,7 @@
           <a:noFill/>
           <a:extLst>
             <a:ext uri="{909E8E84-426E-40dd-AFC4-6F175D3DCCD1}">
-              <a14:hiddenFill xmlns="" xmlns:a14="http://schemas.microsoft.com/office/drawing/2010/main">
+              <a14:hiddenFill xmlns:a14="http://schemas.microsoft.com/office/drawing/2010/main" xmlns="">
                 <a:solidFill>
                   <a:srgbClr val="FFFFFF"/>
                 </a:solidFill>
@@ -4740,14 +4740,14 @@
           <a:effectLst/>
           <a:extLst>
             <a:ext uri="{909E8E84-426E-40dd-AFC4-6F175D3DCCD1}">
-              <a14:hiddenFill xmlns="" xmlns:a14="http://schemas.microsoft.com/office/drawing/2010/main">
+              <a14:hiddenFill xmlns:a14="http://schemas.microsoft.com/office/drawing/2010/main" xmlns="">
                 <a:solidFill>
                   <a:schemeClr val="accent1"/>
                 </a:solidFill>
               </a14:hiddenFill>
             </a:ext>
             <a:ext uri="{91240B29-F687-4f45-9708-019B960494DF}">
-              <a14:hiddenLine xmlns="" xmlns:a14="http://schemas.microsoft.com/office/drawing/2010/main" w="9525">
+              <a14:hiddenLine xmlns:a14="http://schemas.microsoft.com/office/drawing/2010/main" xmlns="" w="9525">
                 <a:solidFill>
                   <a:schemeClr val="tx1"/>
                 </a:solidFill>
@@ -4757,7 +4757,7 @@
               </a14:hiddenLine>
             </a:ext>
             <a:ext uri="{AF507438-7753-43e0-B8FC-AC1667EBCBE1}">
-              <a14:hiddenEffects xmlns="" xmlns:a14="http://schemas.microsoft.com/office/drawing/2010/main">
+              <a14:hiddenEffects xmlns:a14="http://schemas.microsoft.com/office/drawing/2010/main" xmlns="">
                 <a:effectLst>
                   <a:outerShdw blurRad="63500" dist="38099" dir="2700000" algn="ctr" rotWithShape="0">
                     <a:schemeClr val="bg2">
@@ -5250,7 +5250,7 @@
                 <a:ea typeface="ＭＳ Ｐゴシック"/>
               </a:rPr>
               <a:pPr/>
-              <a:t>2015/1/8</a:t>
+              <a:t>2015/1/9</a:t>
             </a:fld>
             <a:endParaRPr lang="ja-JP" altLang="en-US">
               <a:solidFill>
@@ -5410,7 +5410,7 @@
                 <a:ea typeface="ＭＳ Ｐゴシック"/>
               </a:rPr>
               <a:pPr/>
-              <a:t>2015/1/8</a:t>
+              <a:t>2015/1/9</a:t>
             </a:fld>
             <a:endParaRPr lang="ja-JP" altLang="en-US">
               <a:solidFill>
@@ -5547,7 +5547,7 @@
                 <a:ea typeface="ＭＳ Ｐゴシック"/>
               </a:rPr>
               <a:pPr/>
-              <a:t>2015/1/8</a:t>
+              <a:t>2015/1/9</a:t>
             </a:fld>
             <a:endParaRPr lang="ja-JP" altLang="en-US">
               <a:solidFill>
@@ -5898,7 +5898,7 @@
                 <a:ea typeface="ＭＳ Ｐゴシック"/>
               </a:rPr>
               <a:pPr/>
-              <a:t>2015/1/8</a:t>
+              <a:t>2015/1/9</a:t>
             </a:fld>
             <a:endParaRPr lang="ja-JP" altLang="en-US">
               <a:solidFill>
@@ -6193,7 +6193,7 @@
                 <a:ea typeface="ＭＳ Ｐゴシック"/>
               </a:rPr>
               <a:pPr/>
-              <a:t>2015/1/8</a:t>
+              <a:t>2015/1/9</a:t>
             </a:fld>
             <a:endParaRPr lang="ja-JP" altLang="en-US">
               <a:solidFill>
@@ -6480,7 +6480,7 @@
                 <a:ea typeface="ＭＳ Ｐゴシック"/>
               </a:rPr>
               <a:pPr/>
-              <a:t>2015/1/8</a:t>
+              <a:t>2015/1/9</a:t>
             </a:fld>
             <a:endParaRPr kumimoji="1" lang="ja-JP" altLang="en-US">
               <a:solidFill>
@@ -8739,7 +8739,7 @@
         <p:spPr>
           <a:xfrm>
             <a:off x="1721481" y="4445242"/>
-            <a:ext cx="489236" cy="246221"/>
+            <a:ext cx="745717" cy="246221"/>
           </a:xfrm>
           <a:prstGeom prst="rect">
             <a:avLst/>
@@ -8754,7 +8754,7 @@
           <a:p>
             <a:r>
               <a:rPr kumimoji="1" lang="en-US" altLang="ja-JP" sz="1000" dirty="0" smtClean="0"/>
-              <a:t>Detail</a:t>
+              <a:t>Blog Detail</a:t>
             </a:r>
             <a:endParaRPr kumimoji="1" lang="ja-JP" altLang="en-US" sz="1000" dirty="0"/>
           </a:p>
@@ -9890,11 +9890,7 @@
           <a:p>
             <a:r>
               <a:rPr kumimoji="1" lang="en-US" altLang="ja-JP" sz="1000" dirty="0" smtClean="0"/>
-              <a:t>View </a:t>
-            </a:r>
-            <a:r>
-              <a:rPr kumimoji="1" lang="en-US" altLang="ja-JP" sz="1000" dirty="0" smtClean="0"/>
-              <a:t>user’s blog</a:t>
+              <a:t>View user’s blog</a:t>
             </a:r>
             <a:endParaRPr kumimoji="1" lang="ja-JP" altLang="en-US" sz="1000" dirty="0"/>
           </a:p>
@@ -11362,7 +11358,6 @@
               <a:rPr kumimoji="1" lang="en-US" altLang="ja-JP" sz="1000" dirty="0" smtClean="0"/>
               <a:t>Post by : Lam Vy</a:t>
             </a:r>
-            <a:endParaRPr kumimoji="1" lang="en-US" altLang="ja-JP" sz="1000" dirty="0" smtClean="0"/>
           </a:p>
           <a:p>
             <a:pPr algn="just"/>
@@ -11370,7 +11365,6 @@
               <a:rPr kumimoji="1" lang="en-US" altLang="ja-JP" sz="1000" dirty="0" smtClean="0"/>
               <a:t>Post date : 2014-01-08</a:t>
             </a:r>
-            <a:endParaRPr kumimoji="1" lang="en-US" altLang="ja-JP" sz="1000" dirty="0" smtClean="0"/>
           </a:p>
           <a:p>
             <a:pPr algn="just"/>
@@ -13371,7 +13365,6 @@
               <a:rPr kumimoji="1" lang="en-US" altLang="ja-JP" sz="1000" dirty="0" smtClean="0"/>
               <a:t>Post by : Lam Vy</a:t>
             </a:r>
-            <a:endParaRPr kumimoji="1" lang="en-US" altLang="ja-JP" sz="1000" dirty="0" smtClean="0"/>
           </a:p>
           <a:p>
             <a:pPr algn="just"/>
@@ -13379,7 +13372,6 @@
               <a:rPr kumimoji="1" lang="en-US" altLang="ja-JP" sz="1000" dirty="0" smtClean="0"/>
               <a:t>Post date : 2014-01-08</a:t>
             </a:r>
-            <a:endParaRPr kumimoji="1" lang="en-US" altLang="ja-JP" sz="1000" dirty="0" smtClean="0"/>
           </a:p>
           <a:p>
             <a:pPr algn="just"/>
@@ -13637,7 +13629,6 @@
               <a:rPr kumimoji="1" lang="en-US" altLang="ja-JP" sz="1000" dirty="0" smtClean="0"/>
               <a:t>Post by : Lam Vy</a:t>
             </a:r>
-            <a:endParaRPr kumimoji="1" lang="en-US" altLang="ja-JP" sz="1000" dirty="0" smtClean="0"/>
           </a:p>
           <a:p>
             <a:pPr algn="just"/>
@@ -13645,7 +13636,6 @@
               <a:rPr kumimoji="1" lang="en-US" altLang="ja-JP" sz="1000" dirty="0" smtClean="0"/>
               <a:t>Post date : 2014-01-08</a:t>
             </a:r>
-            <a:endParaRPr kumimoji="1" lang="en-US" altLang="ja-JP" sz="1000" dirty="0" smtClean="0"/>
           </a:p>
           <a:p>
             <a:pPr algn="just"/>
@@ -13903,7 +13893,6 @@
               <a:rPr kumimoji="1" lang="en-US" altLang="ja-JP" sz="1000" dirty="0" smtClean="0"/>
               <a:t>Post by : Lam Vy</a:t>
             </a:r>
-            <a:endParaRPr kumimoji="1" lang="en-US" altLang="ja-JP" sz="1000" dirty="0" smtClean="0"/>
           </a:p>
           <a:p>
             <a:pPr algn="just"/>
@@ -13911,7 +13900,6 @@
               <a:rPr kumimoji="1" lang="en-US" altLang="ja-JP" sz="1000" dirty="0" smtClean="0"/>
               <a:t>Post date : 2014-01-08</a:t>
             </a:r>
-            <a:endParaRPr kumimoji="1" lang="en-US" altLang="ja-JP" sz="1000" dirty="0" smtClean="0"/>
           </a:p>
           <a:p>
             <a:pPr algn="just"/>
@@ -14169,7 +14157,6 @@
               <a:rPr kumimoji="1" lang="en-US" altLang="ja-JP" sz="1000" dirty="0" smtClean="0"/>
               <a:t>Post by : Lam Vy</a:t>
             </a:r>
-            <a:endParaRPr kumimoji="1" lang="en-US" altLang="ja-JP" sz="1000" dirty="0" smtClean="0"/>
           </a:p>
           <a:p>
             <a:pPr algn="just"/>
@@ -14177,7 +14164,6 @@
               <a:rPr kumimoji="1" lang="en-US" altLang="ja-JP" sz="1000" dirty="0" smtClean="0"/>
               <a:t>Post date : 2014-01-08</a:t>
             </a:r>
-            <a:endParaRPr kumimoji="1" lang="en-US" altLang="ja-JP" sz="1000" dirty="0" smtClean="0"/>
           </a:p>
           <a:p>
             <a:pPr algn="just"/>
@@ -14435,7 +14421,6 @@
               <a:rPr kumimoji="1" lang="en-US" altLang="ja-JP" sz="1000" dirty="0" smtClean="0"/>
               <a:t>Post by : Lam Vy</a:t>
             </a:r>
-            <a:endParaRPr kumimoji="1" lang="en-US" altLang="ja-JP" sz="1000" dirty="0" smtClean="0"/>
           </a:p>
           <a:p>
             <a:pPr algn="just"/>
@@ -14443,7 +14428,6 @@
               <a:rPr kumimoji="1" lang="en-US" altLang="ja-JP" sz="1000" dirty="0" smtClean="0"/>
               <a:t>Post date : 2014-01-08</a:t>
             </a:r>
-            <a:endParaRPr kumimoji="1" lang="en-US" altLang="ja-JP" sz="1000" dirty="0" smtClean="0"/>
           </a:p>
           <a:p>
             <a:pPr algn="just"/>
@@ -14701,7 +14685,6 @@
               <a:rPr kumimoji="1" lang="en-US" altLang="ja-JP" sz="1000" dirty="0" smtClean="0"/>
               <a:t>Post by : Lam Vy</a:t>
             </a:r>
-            <a:endParaRPr kumimoji="1" lang="en-US" altLang="ja-JP" sz="1000" dirty="0" smtClean="0"/>
           </a:p>
           <a:p>
             <a:pPr algn="just"/>
@@ -14709,7 +14692,6 @@
               <a:rPr kumimoji="1" lang="en-US" altLang="ja-JP" sz="1000" dirty="0" smtClean="0"/>
               <a:t>Post date : 2014-01-08</a:t>
             </a:r>
-            <a:endParaRPr kumimoji="1" lang="en-US" altLang="ja-JP" sz="1000" dirty="0" smtClean="0"/>
           </a:p>
           <a:p>
             <a:pPr algn="just"/>
@@ -14967,7 +14949,6 @@
               <a:rPr kumimoji="1" lang="en-US" altLang="ja-JP" sz="1000" dirty="0" smtClean="0"/>
               <a:t>Post by : Lam Vy</a:t>
             </a:r>
-            <a:endParaRPr kumimoji="1" lang="en-US" altLang="ja-JP" sz="1000" dirty="0" smtClean="0"/>
           </a:p>
           <a:p>
             <a:pPr algn="just"/>
@@ -14975,7 +14956,6 @@
               <a:rPr kumimoji="1" lang="en-US" altLang="ja-JP" sz="1000" dirty="0" smtClean="0"/>
               <a:t>Post date : 2014-01-08</a:t>
             </a:r>
-            <a:endParaRPr kumimoji="1" lang="en-US" altLang="ja-JP" sz="1000" dirty="0" smtClean="0"/>
           </a:p>
           <a:p>
             <a:pPr algn="just"/>
@@ -15233,7 +15213,6 @@
               <a:rPr kumimoji="1" lang="en-US" altLang="ja-JP" sz="1000" dirty="0" smtClean="0"/>
               <a:t>Post by : Lam Vy</a:t>
             </a:r>
-            <a:endParaRPr kumimoji="1" lang="en-US" altLang="ja-JP" sz="1000" dirty="0" smtClean="0"/>
           </a:p>
           <a:p>
             <a:pPr algn="just"/>
@@ -15241,7 +15220,6 @@
               <a:rPr kumimoji="1" lang="en-US" altLang="ja-JP" sz="1000" dirty="0" smtClean="0"/>
               <a:t>Post date : 2014-01-08</a:t>
             </a:r>
-            <a:endParaRPr kumimoji="1" lang="en-US" altLang="ja-JP" sz="1000" dirty="0" smtClean="0"/>
           </a:p>
           <a:p>
             <a:pPr algn="just"/>
@@ -15499,7 +15477,6 @@
               <a:rPr kumimoji="1" lang="en-US" altLang="ja-JP" sz="1000" dirty="0" smtClean="0"/>
               <a:t>Post by : Lam Vy</a:t>
             </a:r>
-            <a:endParaRPr kumimoji="1" lang="en-US" altLang="ja-JP" sz="1000" dirty="0" smtClean="0"/>
           </a:p>
           <a:p>
             <a:pPr algn="just"/>
@@ -15507,7 +15484,6 @@
               <a:rPr kumimoji="1" lang="en-US" altLang="ja-JP" sz="1000" dirty="0" smtClean="0"/>
               <a:t>Post date : 2014-01-08</a:t>
             </a:r>
-            <a:endParaRPr kumimoji="1" lang="en-US" altLang="ja-JP" sz="1000" dirty="0" smtClean="0"/>
           </a:p>
           <a:p>
             <a:pPr algn="just"/>
@@ -20917,11 +20893,7 @@
                     <a:p>
                       <a:r>
                         <a:rPr kumimoji="1" lang="en-US" altLang="ja-JP" sz="1000" dirty="0" smtClean="0"/>
-                        <a:t>Current </a:t>
-                      </a:r>
-                      <a:r>
-                        <a:rPr kumimoji="1" lang="en-US" altLang="ja-JP" sz="1000" dirty="0" smtClean="0"/>
-                        <a:t>page. Click =&gt; logout. Return home page</a:t>
+                        <a:t>Current page. Click =&gt; logout. Return home page</a:t>
                       </a:r>
                       <a:endParaRPr kumimoji="1" lang="ja-JP" altLang="en-US" sz="1000" dirty="0"/>
                     </a:p>
@@ -25502,7 +25474,7 @@
         </p:nvSpPr>
         <p:spPr>
           <a:xfrm>
-            <a:off x="387048" y="1300879"/>
+            <a:off x="439030" y="1274119"/>
             <a:ext cx="2464520" cy="271223"/>
           </a:xfrm>
           <a:prstGeom prst="rect">
@@ -25623,7 +25595,7 @@
         </p:nvSpPr>
         <p:spPr>
           <a:xfrm>
-            <a:off x="387049" y="680151"/>
+            <a:off x="411843" y="783904"/>
             <a:ext cx="1170572" cy="369332"/>
           </a:xfrm>
           <a:prstGeom prst="rect">
@@ -26140,8 +26112,8 @@
           </p:nvSpPr>
           <p:spPr>
             <a:xfrm>
-              <a:off x="77158" y="1591398"/>
-              <a:ext cx="2380606" cy="553998"/>
+              <a:off x="86662" y="1488681"/>
+              <a:ext cx="2380606" cy="707886"/>
             </a:xfrm>
             <a:prstGeom prst="rect">
               <a:avLst/>
@@ -26266,8 +26238,16 @@
               </a:r>
               <a:r>
                 <a:rPr kumimoji="1" lang="en-US" altLang="ja-JP" sz="1000" dirty="0" smtClean="0"/>
-                <a:t> : Vy</a:t>
+                <a:t> : </a:t>
               </a:r>
+              <a:r>
+                <a:rPr kumimoji="1" lang="en-US" altLang="ja-JP" sz="1000" dirty="0" smtClean="0"/>
+                <a:t>Vy</a:t>
+              </a:r>
+            </a:p>
+            <a:p>
+              <a:pPr algn="just"/>
+              <a:endParaRPr kumimoji="1" lang="en-US" altLang="ja-JP" sz="1000" dirty="0" smtClean="0"/>
             </a:p>
             <a:p>
               <a:pPr algn="just"/>
@@ -26311,9 +26291,9 @@
         <p:grpSpPr>
           <a:xfrm>
             <a:off x="2898846" y="2188418"/>
-            <a:ext cx="2438110" cy="888643"/>
+            <a:ext cx="2438110" cy="889558"/>
             <a:chOff x="67655" y="1331212"/>
-            <a:chExt cx="2480533" cy="888643"/>
+            <a:chExt cx="2480533" cy="889558"/>
           </a:xfrm>
         </p:grpSpPr>
         <p:sp>
@@ -26561,8 +26541,8 @@
           </p:nvSpPr>
           <p:spPr>
             <a:xfrm>
-              <a:off x="77158" y="1591398"/>
-              <a:ext cx="2380606" cy="553998"/>
+              <a:off x="90667" y="1512884"/>
+              <a:ext cx="2380606" cy="707886"/>
             </a:xfrm>
             <a:prstGeom prst="rect">
               <a:avLst/>
@@ -26687,8 +26667,16 @@
               </a:r>
               <a:r>
                 <a:rPr kumimoji="1" lang="en-US" altLang="ja-JP" sz="1000" dirty="0" smtClean="0"/>
-                <a:t> : Vy</a:t>
+                <a:t> : </a:t>
               </a:r>
+              <a:r>
+                <a:rPr kumimoji="1" lang="en-US" altLang="ja-JP" sz="1000" dirty="0" smtClean="0"/>
+                <a:t>Vy</a:t>
+              </a:r>
+            </a:p>
+            <a:p>
+              <a:pPr algn="just"/>
+              <a:endParaRPr kumimoji="1" lang="en-US" altLang="ja-JP" sz="1000" dirty="0" smtClean="0"/>
             </a:p>
             <a:p>
               <a:pPr algn="just"/>
@@ -26732,9 +26720,9 @@
         <p:grpSpPr>
           <a:xfrm>
             <a:off x="383028" y="3155187"/>
-            <a:ext cx="2507081" cy="888643"/>
+            <a:ext cx="2507081" cy="889946"/>
             <a:chOff x="67655" y="1331212"/>
-            <a:chExt cx="2480533" cy="888643"/>
+            <a:chExt cx="2480533" cy="889946"/>
           </a:xfrm>
         </p:grpSpPr>
         <p:sp>
@@ -26982,8 +26970,8 @@
           </p:nvSpPr>
           <p:spPr>
             <a:xfrm>
-              <a:off x="77158" y="1591398"/>
-              <a:ext cx="2380606" cy="553998"/>
+              <a:off x="77158" y="1513272"/>
+              <a:ext cx="2380606" cy="707886"/>
             </a:xfrm>
             <a:prstGeom prst="rect">
               <a:avLst/>
@@ -27108,8 +27096,16 @@
               </a:r>
               <a:r>
                 <a:rPr kumimoji="1" lang="en-US" altLang="ja-JP" sz="1000" dirty="0" smtClean="0"/>
-                <a:t> : Vy</a:t>
+                <a:t> : </a:t>
               </a:r>
+              <a:r>
+                <a:rPr kumimoji="1" lang="en-US" altLang="ja-JP" sz="1000" dirty="0" smtClean="0"/>
+                <a:t>Vy</a:t>
+              </a:r>
+            </a:p>
+            <a:p>
+              <a:pPr algn="just"/>
+              <a:endParaRPr kumimoji="1" lang="en-US" altLang="ja-JP" sz="1000" dirty="0" smtClean="0"/>
             </a:p>
             <a:p>
               <a:pPr algn="just"/>
@@ -27152,10 +27148,10 @@
         </p:nvGrpSpPr>
         <p:grpSpPr>
           <a:xfrm>
-            <a:off x="392633" y="4137794"/>
-            <a:ext cx="2507081" cy="888643"/>
-            <a:chOff x="67655" y="1331212"/>
-            <a:chExt cx="2480533" cy="888643"/>
+            <a:off x="392632" y="4137794"/>
+            <a:ext cx="2507082" cy="888643"/>
+            <a:chOff x="67654" y="1331212"/>
+            <a:chExt cx="2480534" cy="888643"/>
           </a:xfrm>
         </p:grpSpPr>
         <p:sp>
@@ -27403,8 +27399,8 @@
           </p:nvSpPr>
           <p:spPr>
             <a:xfrm>
-              <a:off x="77158" y="1591398"/>
-              <a:ext cx="2380606" cy="553998"/>
+              <a:off x="67654" y="1490291"/>
+              <a:ext cx="2380606" cy="707886"/>
             </a:xfrm>
             <a:prstGeom prst="rect">
               <a:avLst/>
@@ -27529,8 +27525,16 @@
               </a:r>
               <a:r>
                 <a:rPr kumimoji="1" lang="en-US" altLang="ja-JP" sz="1000" dirty="0" smtClean="0"/>
-                <a:t> : Vy</a:t>
+                <a:t> : </a:t>
               </a:r>
+              <a:r>
+                <a:rPr kumimoji="1" lang="en-US" altLang="ja-JP" sz="1000" dirty="0" smtClean="0"/>
+                <a:t>Vy</a:t>
+              </a:r>
+            </a:p>
+            <a:p>
+              <a:pPr algn="just"/>
+              <a:endParaRPr kumimoji="1" lang="en-US" altLang="ja-JP" sz="1000" dirty="0" smtClean="0"/>
             </a:p>
             <a:p>
               <a:pPr algn="just"/>
@@ -27574,9 +27578,9 @@
         <p:grpSpPr>
           <a:xfrm>
             <a:off x="402238" y="5120401"/>
-            <a:ext cx="2507081" cy="888643"/>
+            <a:ext cx="2507081" cy="903582"/>
             <a:chOff x="67655" y="1331212"/>
-            <a:chExt cx="2480533" cy="888643"/>
+            <a:chExt cx="2480533" cy="903582"/>
           </a:xfrm>
         </p:grpSpPr>
         <p:sp>
@@ -27824,8 +27828,8 @@
           </p:nvSpPr>
           <p:spPr>
             <a:xfrm>
-              <a:off x="77158" y="1591398"/>
-              <a:ext cx="2380606" cy="553998"/>
+              <a:off x="90758" y="1526908"/>
+              <a:ext cx="2380606" cy="707886"/>
             </a:xfrm>
             <a:prstGeom prst="rect">
               <a:avLst/>
@@ -27950,8 +27954,16 @@
               </a:r>
               <a:r>
                 <a:rPr kumimoji="1" lang="en-US" altLang="ja-JP" sz="1000" dirty="0" smtClean="0"/>
-                <a:t> : Vy</a:t>
+                <a:t> : </a:t>
               </a:r>
+              <a:r>
+                <a:rPr kumimoji="1" lang="en-US" altLang="ja-JP" sz="1000" dirty="0" smtClean="0"/>
+                <a:t>Vy</a:t>
+              </a:r>
+            </a:p>
+            <a:p>
+              <a:pPr algn="just"/>
+              <a:endParaRPr kumimoji="1" lang="en-US" altLang="ja-JP" sz="1000" dirty="0" smtClean="0"/>
             </a:p>
             <a:p>
               <a:pPr algn="just"/>
@@ -27994,10 +28006,10 @@
         </p:nvGrpSpPr>
         <p:grpSpPr>
           <a:xfrm>
-            <a:off x="2899895" y="3155186"/>
-            <a:ext cx="2438110" cy="888643"/>
-            <a:chOff x="67655" y="1331212"/>
-            <a:chExt cx="2480533" cy="888643"/>
+            <a:off x="2896250" y="3155186"/>
+            <a:ext cx="2441755" cy="889947"/>
+            <a:chOff x="63947" y="1331212"/>
+            <a:chExt cx="2484241" cy="889947"/>
           </a:xfrm>
         </p:grpSpPr>
         <p:sp>
@@ -28245,8 +28257,8 @@
           </p:nvSpPr>
           <p:spPr>
             <a:xfrm>
-              <a:off x="77158" y="1591398"/>
-              <a:ext cx="2380606" cy="553998"/>
+              <a:off x="63947" y="1513273"/>
+              <a:ext cx="2380606" cy="707886"/>
             </a:xfrm>
             <a:prstGeom prst="rect">
               <a:avLst/>
@@ -28371,8 +28383,16 @@
               </a:r>
               <a:r>
                 <a:rPr kumimoji="1" lang="en-US" altLang="ja-JP" sz="1000" dirty="0" smtClean="0"/>
-                <a:t> : Vy</a:t>
+                <a:t> : </a:t>
               </a:r>
+              <a:r>
+                <a:rPr kumimoji="1" lang="en-US" altLang="ja-JP" sz="1000" dirty="0" smtClean="0"/>
+                <a:t>Vy</a:t>
+              </a:r>
+            </a:p>
+            <a:p>
+              <a:pPr algn="just"/>
+              <a:endParaRPr kumimoji="1" lang="en-US" altLang="ja-JP" sz="1000" dirty="0" smtClean="0"/>
             </a:p>
             <a:p>
               <a:pPr algn="just"/>
@@ -28415,10 +28435,10 @@
         </p:nvGrpSpPr>
         <p:grpSpPr>
           <a:xfrm>
-            <a:off x="2903550" y="4133912"/>
-            <a:ext cx="2438110" cy="888643"/>
-            <a:chOff x="67655" y="1331212"/>
-            <a:chExt cx="2480533" cy="888643"/>
+            <a:off x="2899895" y="4133912"/>
+            <a:ext cx="2441765" cy="902198"/>
+            <a:chOff x="63936" y="1331212"/>
+            <a:chExt cx="2484252" cy="902198"/>
           </a:xfrm>
         </p:grpSpPr>
         <p:sp>
@@ -28666,8 +28686,8 @@
           </p:nvSpPr>
           <p:spPr>
             <a:xfrm>
-              <a:off x="77158" y="1591398"/>
-              <a:ext cx="2380606" cy="553998"/>
+              <a:off x="63936" y="1525524"/>
+              <a:ext cx="2380606" cy="707886"/>
             </a:xfrm>
             <a:prstGeom prst="rect">
               <a:avLst/>
@@ -28792,8 +28812,16 @@
               </a:r>
               <a:r>
                 <a:rPr kumimoji="1" lang="en-US" altLang="ja-JP" sz="1000" dirty="0" smtClean="0"/>
-                <a:t> : Vy</a:t>
+                <a:t> : </a:t>
               </a:r>
+              <a:r>
+                <a:rPr kumimoji="1" lang="en-US" altLang="ja-JP" sz="1000" dirty="0" smtClean="0"/>
+                <a:t>Vy</a:t>
+              </a:r>
+            </a:p>
+            <a:p>
+              <a:pPr algn="just"/>
+              <a:endParaRPr kumimoji="1" lang="en-US" altLang="ja-JP" sz="1000" dirty="0" smtClean="0"/>
             </a:p>
             <a:p>
               <a:pPr algn="just"/>
@@ -29087,8 +29115,8 @@
           </p:nvSpPr>
           <p:spPr>
             <a:xfrm>
-              <a:off x="77158" y="1591398"/>
-              <a:ext cx="2380606" cy="553998"/>
+              <a:off x="77158" y="1487585"/>
+              <a:ext cx="2380606" cy="707886"/>
             </a:xfrm>
             <a:prstGeom prst="rect">
               <a:avLst/>
@@ -29213,8 +29241,16 @@
               </a:r>
               <a:r>
                 <a:rPr kumimoji="1" lang="en-US" altLang="ja-JP" sz="1000" dirty="0" smtClean="0"/>
-                <a:t> : Vy</a:t>
+                <a:t> : </a:t>
               </a:r>
+              <a:r>
+                <a:rPr kumimoji="1" lang="en-US" altLang="ja-JP" sz="1000" dirty="0" smtClean="0"/>
+                <a:t>Vy</a:t>
+              </a:r>
+            </a:p>
+            <a:p>
+              <a:pPr algn="just"/>
+              <a:endParaRPr kumimoji="1" lang="en-US" altLang="ja-JP" sz="1000" dirty="0" smtClean="0"/>
             </a:p>
             <a:p>
               <a:pPr algn="just"/>
@@ -29517,14 +29553,14 @@
           <p:nvPr>
             <p:extLst>
               <p:ext uri="{D42A27DB-BD31-4B8C-83A1-F6EECF244321}">
-                <p14:modId xmlns:p14="http://schemas.microsoft.com/office/powerpoint/2010/main" val="2942688539"/>
+                <p14:modId xmlns:p14="http://schemas.microsoft.com/office/powerpoint/2010/main" val="3309887828"/>
               </p:ext>
             </p:extLst>
           </p:nvPr>
         </p:nvGraphicFramePr>
         <p:xfrm>
           <a:off x="4651196" y="876073"/>
-          <a:ext cx="4289605" cy="5193372"/>
+          <a:ext cx="4289605" cy="5589612"/>
         </p:xfrm>
         <a:graphic>
           <a:graphicData uri="http://schemas.openxmlformats.org/drawingml/2006/table">
@@ -29534,8 +29570,8 @@
               </a:tblPr>
               <a:tblGrid>
                 <a:gridCol w="390705"/>
-                <a:gridCol w="1009318"/>
-                <a:gridCol w="1173740"/>
+                <a:gridCol w="1410414"/>
+                <a:gridCol w="772644"/>
                 <a:gridCol w="1211182"/>
                 <a:gridCol w="504660"/>
               </a:tblGrid>
@@ -30426,6 +30462,73 @@
                       <a:r>
                         <a:rPr kumimoji="1" lang="en-US" altLang="ja-JP" sz="1000" dirty="0" smtClean="0"/>
                         <a:t>12</a:t>
+                      </a:r>
+                      <a:endParaRPr kumimoji="1" lang="ja-JP" altLang="en-US" sz="1000" dirty="0"/>
+                    </a:p>
+                  </a:txBody>
+                  <a:tcPr/>
+                </a:tc>
+                <a:tc>
+                  <a:txBody>
+                    <a:bodyPr/>
+                    <a:lstStyle/>
+                    <a:p>
+                      <a:r>
+                        <a:rPr kumimoji="1" lang="en-US" altLang="ja-JP" sz="1000" dirty="0" smtClean="0"/>
+                        <a:t>Retype password</a:t>
+                      </a:r>
+                      <a:endParaRPr kumimoji="1" lang="ja-JP" altLang="en-US" sz="1000" dirty="0"/>
+                    </a:p>
+                  </a:txBody>
+                  <a:tcPr/>
+                </a:tc>
+                <a:tc>
+                  <a:txBody>
+                    <a:bodyPr/>
+                    <a:lstStyle/>
+                    <a:p>
+                      <a:endParaRPr kumimoji="1" lang="ja-JP" altLang="en-US" sz="1000" dirty="0"/>
+                    </a:p>
+                  </a:txBody>
+                  <a:tcPr/>
+                </a:tc>
+                <a:tc>
+                  <a:txBody>
+                    <a:bodyPr/>
+                    <a:lstStyle/>
+                    <a:p>
+                      <a:r>
+                        <a:rPr kumimoji="1" lang="en-US" altLang="ja-JP" sz="1000" dirty="0" smtClean="0"/>
+                        <a:t>Input new password again</a:t>
+                      </a:r>
+                      <a:endParaRPr kumimoji="1" lang="ja-JP" altLang="en-US" sz="1000" dirty="0"/>
+                    </a:p>
+                  </a:txBody>
+                  <a:tcPr/>
+                </a:tc>
+                <a:tc>
+                  <a:txBody>
+                    <a:bodyPr/>
+                    <a:lstStyle/>
+                    <a:p>
+                      <a:endParaRPr kumimoji="1" lang="ja-JP" altLang="en-US" sz="1000" dirty="0">
+                        <a:latin typeface="Calibri"/>
+                        <a:cs typeface="Calibri"/>
+                      </a:endParaRPr>
+                    </a:p>
+                  </a:txBody>
+                  <a:tcPr/>
+                </a:tc>
+              </a:tr>
+              <a:tr h="327082">
+                <a:tc>
+                  <a:txBody>
+                    <a:bodyPr/>
+                    <a:lstStyle/>
+                    <a:p>
+                      <a:r>
+                        <a:rPr kumimoji="1" lang="en-US" altLang="ja-JP" sz="1000" dirty="0" smtClean="0"/>
+                        <a:t>13</a:t>
                       </a:r>
                       <a:endParaRPr kumimoji="1" lang="ja-JP" altLang="en-US" sz="1000" dirty="0"/>
                     </a:p>
@@ -30580,9 +30683,9 @@
         <p:grpSpPr>
           <a:xfrm>
             <a:off x="325129" y="2155572"/>
-            <a:ext cx="2810555" cy="1178875"/>
+            <a:ext cx="2810555" cy="1269191"/>
             <a:chOff x="298163" y="2680453"/>
-            <a:chExt cx="2810555" cy="1178875"/>
+            <a:chExt cx="2810555" cy="1269191"/>
           </a:xfrm>
         </p:grpSpPr>
         <p:sp>
@@ -30593,7 +30696,7 @@
           </p:nvSpPr>
           <p:spPr>
             <a:xfrm>
-              <a:off x="1263430" y="3458879"/>
+              <a:off x="1263430" y="3677781"/>
               <a:ext cx="763361" cy="203049"/>
             </a:xfrm>
             <a:prstGeom prst="rect">
@@ -30950,7 +31053,157 @@
           </p:nvSpPr>
           <p:spPr>
             <a:xfrm>
-              <a:off x="1900010" y="3613107"/>
+              <a:off x="2012935" y="3703423"/>
+              <a:ext cx="393056" cy="246221"/>
+            </a:xfrm>
+            <a:prstGeom prst="rect">
+              <a:avLst/>
+            </a:prstGeom>
+            <a:noFill/>
+          </p:spPr>
+          <p:txBody>
+            <a:bodyPr wrap="none" rtlCol="0">
+              <a:spAutoFit/>
+            </a:bodyPr>
+            <a:lstStyle/>
+            <a:p>
+              <a:r>
+                <a:rPr kumimoji="1" lang="en-US" altLang="ja-JP" sz="1000" dirty="0" smtClean="0">
+                  <a:solidFill>
+                    <a:srgbClr val="FF0000"/>
+                  </a:solidFill>
+                </a:rPr>
+                <a:t>(13)</a:t>
+              </a:r>
+              <a:endParaRPr kumimoji="1" lang="ja-JP" altLang="en-US" sz="1000" dirty="0">
+                <a:solidFill>
+                  <a:srgbClr val="FF0000"/>
+                </a:solidFill>
+              </a:endParaRPr>
+            </a:p>
+          </p:txBody>
+        </p:sp>
+        <p:sp>
+          <p:nvSpPr>
+            <p:cNvPr id="38" name="Rectangle 37"/>
+            <p:cNvSpPr/>
+            <p:nvPr/>
+          </p:nvSpPr>
+          <p:spPr>
+            <a:xfrm>
+              <a:off x="1263430" y="3324871"/>
+              <a:ext cx="1384300" cy="192975"/>
+            </a:xfrm>
+            <a:prstGeom prst="rect">
+              <a:avLst/>
+            </a:prstGeom>
+            <a:gradFill flip="none" rotWithShape="1">
+              <a:gsLst>
+                <a:gs pos="0">
+                  <a:schemeClr val="accent3">
+                    <a:lumMod val="67000"/>
+                  </a:schemeClr>
+                </a:gs>
+                <a:gs pos="48000">
+                  <a:schemeClr val="accent3">
+                    <a:lumMod val="97000"/>
+                    <a:lumOff val="3000"/>
+                  </a:schemeClr>
+                </a:gs>
+                <a:gs pos="100000">
+                  <a:schemeClr val="accent3">
+                    <a:lumMod val="60000"/>
+                    <a:lumOff val="40000"/>
+                  </a:schemeClr>
+                </a:gs>
+              </a:gsLst>
+              <a:lin ang="16200000" scaled="1"/>
+              <a:tileRect/>
+            </a:gradFill>
+            <a:ln>
+              <a:solidFill>
+                <a:schemeClr val="tx1"/>
+              </a:solidFill>
+            </a:ln>
+            <a:effectLst/>
+          </p:spPr>
+          <p:style>
+            <a:lnRef idx="1">
+              <a:schemeClr val="accent1"/>
+            </a:lnRef>
+            <a:fillRef idx="3">
+              <a:schemeClr val="accent1"/>
+            </a:fillRef>
+            <a:effectRef idx="2">
+              <a:schemeClr val="accent1"/>
+            </a:effectRef>
+            <a:fontRef idx="minor">
+              <a:schemeClr val="lt1"/>
+            </a:fontRef>
+          </p:style>
+          <p:txBody>
+            <a:bodyPr rtlCol="0" anchor="ctr"/>
+            <a:lstStyle/>
+            <a:p>
+              <a:r>
+                <a:rPr kumimoji="1" lang="en-US" altLang="ja-JP" sz="800" i="1" dirty="0" smtClean="0">
+                  <a:solidFill>
+                    <a:schemeClr val="bg1"/>
+                  </a:solidFill>
+                </a:rPr>
+                <a:t>Retype password</a:t>
+              </a:r>
+              <a:endParaRPr kumimoji="1" lang="ja-JP" altLang="en-US" sz="800" i="1" dirty="0">
+                <a:solidFill>
+                  <a:schemeClr val="bg1"/>
+                </a:solidFill>
+              </a:endParaRPr>
+            </a:p>
+          </p:txBody>
+        </p:sp>
+        <p:sp>
+          <p:nvSpPr>
+            <p:cNvPr id="39" name="TextBox 38"/>
+            <p:cNvSpPr txBox="1"/>
+            <p:nvPr/>
+          </p:nvSpPr>
+          <p:spPr>
+            <a:xfrm>
+              <a:off x="298163" y="3312926"/>
+              <a:ext cx="1111202" cy="246221"/>
+            </a:xfrm>
+            <a:prstGeom prst="rect">
+              <a:avLst/>
+            </a:prstGeom>
+            <a:noFill/>
+          </p:spPr>
+          <p:txBody>
+            <a:bodyPr wrap="none" rtlCol="0">
+              <a:spAutoFit/>
+            </a:bodyPr>
+            <a:lstStyle/>
+            <a:p>
+              <a:r>
+                <a:rPr kumimoji="1" lang="en-US" altLang="ja-JP" sz="1000" dirty="0" smtClean="0"/>
+                <a:t>Retype password</a:t>
+              </a:r>
+              <a:r>
+                <a:rPr kumimoji="1" lang="en-US" altLang="ja-JP" sz="1000" dirty="0" smtClean="0"/>
+                <a:t>:</a:t>
+              </a:r>
+              <a:endParaRPr kumimoji="1" lang="ja-JP" altLang="en-US" sz="1000" dirty="0"/>
+            </a:p>
+          </p:txBody>
+        </p:sp>
+        <p:sp>
+          <p:nvSpPr>
+            <p:cNvPr id="40" name="TextBox 39"/>
+            <p:cNvSpPr txBox="1"/>
+            <p:nvPr/>
+          </p:nvSpPr>
+          <p:spPr>
+            <a:xfrm>
+              <a:off x="2715662" y="3268682"/>
               <a:ext cx="393056" cy="246221"/>
             </a:xfrm>
             <a:prstGeom prst="rect">
@@ -31133,11 +31386,7 @@
               </a:r>
               <a:r>
                 <a:rPr kumimoji="1" lang="en-US" altLang="ja-JP" sz="1050" dirty="0" smtClean="0"/>
-                <a:t>/users/ </a:t>
-              </a:r>
-              <a:r>
-                <a:rPr kumimoji="1" lang="en-US" altLang="ja-JP" sz="1050" dirty="0" smtClean="0"/>
-                <a:t>password</a:t>
+                <a:t>/users/ password</a:t>
               </a:r>
               <a:endParaRPr kumimoji="1" lang="ja-JP" altLang="en-US" sz="1050" dirty="0"/>
             </a:p>

</xml_diff>